<commit_message>
Finalizando la presentacion power point. Quizás se añada un capítulo final con las graficas.
</commit_message>
<xml_diff>
--- a/Presentation/Algoritmo de Strassen.pptx
+++ b/Presentation/Algoritmo de Strassen.pptx
@@ -5,7 +5,7 @@
     <p:sldMasterId id="2147483720" r:id="rId1"/>
   </p:sldMasterIdLst>
   <p:notesMasterIdLst>
-    <p:notesMasterId r:id="rId14"/>
+    <p:notesMasterId r:id="rId17"/>
   </p:notesMasterIdLst>
   <p:sldIdLst>
     <p:sldId id="256" r:id="rId2"/>
@@ -20,6 +20,9 @@
     <p:sldId id="265" r:id="rId11"/>
     <p:sldId id="266" r:id="rId12"/>
     <p:sldId id="267" r:id="rId13"/>
+    <p:sldId id="268" r:id="rId14"/>
+    <p:sldId id="269" r:id="rId15"/>
+    <p:sldId id="270" r:id="rId16"/>
   </p:sldIdLst>
   <p:sldSz cx="9144000" cy="6858000" type="screen4x3"/>
   <p:notesSz cx="6858000" cy="9144000"/>
@@ -135,6 +138,9 @@
             <p14:sldId id="265"/>
             <p14:sldId id="266"/>
             <p14:sldId id="267"/>
+            <p14:sldId id="268"/>
+            <p14:sldId id="269"/>
+            <p14:sldId id="270"/>
           </p14:sldIdLst>
         </p14:section>
       </p14:sectionLst>
@@ -239,7 +245,7 @@
           <a:p>
             <a:fld id="{A7D22C7C-4AE1-8249-B109-8D60AB0F9C19}" type="datetimeFigureOut">
               <a:rPr lang="en-US" smtClean="0"/>
-              <a:t>3/17/17</a:t>
+              <a:t>3/19/17</a:t>
             </a:fld>
             <a:endParaRPr lang="en-US"/>
           </a:p>
@@ -582,6 +588,90 @@
     <p:extLst>
       <p:ext uri="{BB962C8B-B14F-4D97-AF65-F5344CB8AC3E}">
         <p14:creationId xmlns:p14="http://schemas.microsoft.com/office/powerpoint/2010/main" val="2139824655"/>
+      </p:ext>
+    </p:extLst>
+  </p:cSld>
+  <p:clrMapOvr>
+    <a:masterClrMapping/>
+  </p:clrMapOvr>
+</p:notes>
+</file>
+
+<file path=ppt/notesSlides/notesSlide2.xml><?xml version="1.0" encoding="utf-8"?>
+<p:notes xmlns:a="http://schemas.openxmlformats.org/drawingml/2006/main" xmlns:r="http://schemas.openxmlformats.org/officeDocument/2006/relationships" xmlns:p="http://schemas.openxmlformats.org/presentationml/2006/main">
+  <p:cSld>
+    <p:spTree>
+      <p:nvGrpSpPr>
+        <p:cNvPr id="1" name=""/>
+        <p:cNvGrpSpPr/>
+        <p:nvPr/>
+      </p:nvGrpSpPr>
+      <p:grpSpPr>
+        <a:xfrm>
+          <a:off x="0" y="0"/>
+          <a:ext cx="0" cy="0"/>
+          <a:chOff x="0" y="0"/>
+          <a:chExt cx="0" cy="0"/>
+        </a:xfrm>
+      </p:grpSpPr>
+      <p:sp>
+        <p:nvSpPr>
+          <p:cNvPr id="2" name="Slide Image Placeholder 1"/>
+          <p:cNvSpPr>
+            <a:spLocks noGrp="1" noRot="1" noChangeAspect="1"/>
+          </p:cNvSpPr>
+          <p:nvPr>
+            <p:ph type="sldImg"/>
+          </p:nvPr>
+        </p:nvSpPr>
+        <p:spPr/>
+      </p:sp>
+      <p:sp>
+        <p:nvSpPr>
+          <p:cNvPr id="3" name="Notes Placeholder 2"/>
+          <p:cNvSpPr>
+            <a:spLocks noGrp="1"/>
+          </p:cNvSpPr>
+          <p:nvPr>
+            <p:ph type="body" idx="1"/>
+          </p:nvPr>
+        </p:nvSpPr>
+        <p:spPr/>
+        <p:txBody>
+          <a:bodyPr/>
+          <a:lstStyle/>
+          <a:p>
+            <a:endParaRPr lang="en-US" dirty="0"/>
+          </a:p>
+        </p:txBody>
+      </p:sp>
+      <p:sp>
+        <p:nvSpPr>
+          <p:cNvPr id="4" name="Slide Number Placeholder 3"/>
+          <p:cNvSpPr>
+            <a:spLocks noGrp="1"/>
+          </p:cNvSpPr>
+          <p:nvPr>
+            <p:ph type="sldNum" sz="quarter" idx="10"/>
+          </p:nvPr>
+        </p:nvSpPr>
+        <p:spPr/>
+        <p:txBody>
+          <a:bodyPr/>
+          <a:lstStyle/>
+          <a:p>
+            <a:fld id="{BD1516EE-84E5-B04F-AD4E-3B6AC933E858}" type="slidenum">
+              <a:rPr lang="en-US" smtClean="0"/>
+              <a:t>13</a:t>
+            </a:fld>
+            <a:endParaRPr lang="en-US"/>
+          </a:p>
+        </p:txBody>
+      </p:sp>
+    </p:spTree>
+    <p:extLst>
+      <p:ext uri="{BB962C8B-B14F-4D97-AF65-F5344CB8AC3E}">
+        <p14:creationId xmlns:p14="http://schemas.microsoft.com/office/powerpoint/2010/main" val="582836947"/>
       </p:ext>
     </p:extLst>
   </p:cSld>
@@ -1216,7 +1306,7 @@
           <a:p>
             <a:fld id="{2B4FA694-23BF-49E0-88B7-1D0181BBADAA}" type="datetimeFigureOut">
               <a:rPr lang="es-ES" smtClean="0"/>
-              <a:t>17/3/17</a:t>
+              <a:t>19/3/17</a:t>
             </a:fld>
             <a:endParaRPr lang="es-ES"/>
           </a:p>
@@ -1412,7 +1502,7 @@
           <a:p>
             <a:fld id="{2B4FA694-23BF-49E0-88B7-1D0181BBADAA}" type="datetimeFigureOut">
               <a:rPr lang="es-ES" smtClean="0"/>
-              <a:t>17/3/17</a:t>
+              <a:t>19/3/17</a:t>
             </a:fld>
             <a:endParaRPr lang="es-ES"/>
           </a:p>
@@ -1597,7 +1687,7 @@
           <a:p>
             <a:fld id="{2B4FA694-23BF-49E0-88B7-1D0181BBADAA}" type="datetimeFigureOut">
               <a:rPr lang="es-ES" smtClean="0"/>
-              <a:t>17/3/17</a:t>
+              <a:t>19/3/17</a:t>
             </a:fld>
             <a:endParaRPr lang="es-ES"/>
           </a:p>
@@ -1747,7 +1837,7 @@
           <a:p>
             <a:fld id="{2B4FA694-23BF-49E0-88B7-1D0181BBADAA}" type="datetimeFigureOut">
               <a:rPr lang="es-ES" smtClean="0"/>
-              <a:t>17/3/17</a:t>
+              <a:t>19/3/17</a:t>
             </a:fld>
             <a:endParaRPr lang="es-ES"/>
           </a:p>
@@ -1997,7 +2087,7 @@
           <a:p>
             <a:fld id="{2B4FA694-23BF-49E0-88B7-1D0181BBADAA}" type="datetimeFigureOut">
               <a:rPr lang="es-ES" smtClean="0"/>
-              <a:t>17/3/17</a:t>
+              <a:t>19/3/17</a:t>
             </a:fld>
             <a:endParaRPr lang="es-ES"/>
           </a:p>
@@ -2401,7 +2491,7 @@
           <a:p>
             <a:fld id="{2B4FA694-23BF-49E0-88B7-1D0181BBADAA}" type="datetimeFigureOut">
               <a:rPr lang="es-ES" smtClean="0"/>
-              <a:t>17/3/17</a:t>
+              <a:t>19/3/17</a:t>
             </a:fld>
             <a:endParaRPr lang="es-ES"/>
           </a:p>
@@ -2842,7 +2932,7 @@
           <a:p>
             <a:fld id="{2B4FA694-23BF-49E0-88B7-1D0181BBADAA}" type="datetimeFigureOut">
               <a:rPr lang="es-ES" smtClean="0"/>
-              <a:t>17/3/17</a:t>
+              <a:t>19/3/17</a:t>
             </a:fld>
             <a:endParaRPr lang="es-ES"/>
           </a:p>
@@ -2938,7 +3028,7 @@
           <a:p>
             <a:fld id="{2B4FA694-23BF-49E0-88B7-1D0181BBADAA}" type="datetimeFigureOut">
               <a:rPr lang="es-ES" smtClean="0"/>
-              <a:t>17/3/17</a:t>
+              <a:t>19/3/17</a:t>
             </a:fld>
             <a:endParaRPr lang="es-ES"/>
           </a:p>
@@ -3059,7 +3149,7 @@
           <a:p>
             <a:fld id="{2B4FA694-23BF-49E0-88B7-1D0181BBADAA}" type="datetimeFigureOut">
               <a:rPr lang="es-ES" smtClean="0"/>
-              <a:t>17/3/17</a:t>
+              <a:t>19/3/17</a:t>
             </a:fld>
             <a:endParaRPr lang="es-ES"/>
           </a:p>
@@ -3328,7 +3418,7 @@
           <a:p>
             <a:fld id="{2B4FA694-23BF-49E0-88B7-1D0181BBADAA}" type="datetimeFigureOut">
               <a:rPr lang="es-ES" smtClean="0"/>
-              <a:t>17/3/17</a:t>
+              <a:t>19/3/17</a:t>
             </a:fld>
             <a:endParaRPr lang="es-ES"/>
           </a:p>
@@ -3528,7 +3618,7 @@
           <a:p>
             <a:fld id="{2B4FA694-23BF-49E0-88B7-1D0181BBADAA}" type="datetimeFigureOut">
               <a:rPr lang="es-ES" smtClean="0"/>
-              <a:t>17/3/17</a:t>
+              <a:t>19/3/17</a:t>
             </a:fld>
             <a:endParaRPr lang="es-ES"/>
           </a:p>
@@ -4655,7 +4745,7 @@
           <a:p>
             <a:fld id="{2B4FA694-23BF-49E0-88B7-1D0181BBADAA}" type="datetimeFigureOut">
               <a:rPr lang="es-ES" smtClean="0"/>
-              <a:t>17/3/17</a:t>
+              <a:t>19/3/17</a:t>
             </a:fld>
             <a:endParaRPr lang="es-ES"/>
           </a:p>
@@ -6290,6 +6380,13 @@
   <p:clrMapOvr>
     <a:masterClrMapping/>
   </p:clrMapOvr>
+  <p:timing>
+    <p:tnLst>
+      <p:par>
+        <p:cTn id="1" dur="indefinite" restart="never" nodeType="tmRoot"/>
+      </p:par>
+    </p:tnLst>
+  </p:timing>
 </p:sld>
 </file>
 
@@ -6476,15 +6573,7 @@
                 <a:ea typeface="Calibri" charset="0"/>
                 <a:cs typeface="Calibri" charset="0"/>
               </a:rPr>
-              <a:t>T(n/2</a:t>
-            </a:r>
-            <a:r>
-              <a:rPr lang="en-US" sz="2800" dirty="0" smtClean="0">
-                <a:latin typeface="Calibri" charset="0"/>
-                <a:ea typeface="Calibri" charset="0"/>
-                <a:cs typeface="Calibri" charset="0"/>
-              </a:rPr>
-              <a:t>) + </a:t>
+              <a:t>T(n/2) + </a:t>
             </a:r>
             <a:r>
               <a:rPr lang="en-US" sz="2800" dirty="0">
@@ -6590,6 +6679,13 @@
   <p:clrMapOvr>
     <a:masterClrMapping/>
   </p:clrMapOvr>
+  <p:timing>
+    <p:tnLst>
+      <p:par>
+        <p:cTn id="1" dur="indefinite" restart="never" nodeType="tmRoot"/>
+      </p:par>
+    </p:tnLst>
+  </p:timing>
 </p:sld>
 </file>
 
@@ -6776,15 +6872,7 @@
                 <a:ea typeface="Calibri" charset="0"/>
                 <a:cs typeface="Calibri" charset="0"/>
               </a:rPr>
-              <a:t>T(n/2</a:t>
-            </a:r>
-            <a:r>
-              <a:rPr lang="en-US" sz="2800" dirty="0" smtClean="0">
-                <a:latin typeface="Calibri" charset="0"/>
-                <a:ea typeface="Calibri" charset="0"/>
-                <a:cs typeface="Calibri" charset="0"/>
-              </a:rPr>
-              <a:t>) + </a:t>
+              <a:t>T(n/2) + </a:t>
             </a:r>
             <a:r>
               <a:rPr lang="en-US" sz="2800" dirty="0">
@@ -6865,14 +6953,14 @@
           <a:lstStyle/>
           <a:p>
             <a:r>
-              <a:rPr lang="en-US" sz="2800" b="1" smtClean="0">
+              <a:rPr lang="en-US" sz="2800" b="1" dirty="0" smtClean="0">
                 <a:latin typeface="Calibri" charset="0"/>
                 <a:ea typeface="Calibri" charset="0"/>
                 <a:cs typeface="Calibri" charset="0"/>
               </a:rPr>
               <a:t>RECURRENCIA</a:t>
             </a:r>
-            <a:endParaRPr lang="en-US" sz="2800" b="1">
+            <a:endParaRPr lang="en-US" sz="2800" b="1" dirty="0">
               <a:latin typeface="Calibri" charset="0"/>
               <a:ea typeface="Calibri" charset="0"/>
               <a:cs typeface="Calibri" charset="0"/>
@@ -7034,6 +7122,737 @@
   <p:clrMapOvr>
     <a:masterClrMapping/>
   </p:clrMapOvr>
+  <p:timing>
+    <p:tnLst>
+      <p:par>
+        <p:cTn id="1" dur="indefinite" restart="never" nodeType="tmRoot"/>
+      </p:par>
+    </p:tnLst>
+  </p:timing>
+</p:sld>
+</file>
+
+<file path=ppt/slides/slide13.xml><?xml version="1.0" encoding="utf-8"?>
+<p:sld xmlns:a="http://schemas.openxmlformats.org/drawingml/2006/main" xmlns:r="http://schemas.openxmlformats.org/officeDocument/2006/relationships" xmlns:p="http://schemas.openxmlformats.org/presentationml/2006/main">
+  <p:cSld>
+    <p:spTree>
+      <p:nvGrpSpPr>
+        <p:cNvPr id="1" name=""/>
+        <p:cNvGrpSpPr/>
+        <p:nvPr/>
+      </p:nvGrpSpPr>
+      <p:grpSpPr>
+        <a:xfrm>
+          <a:off x="0" y="0"/>
+          <a:ext cx="0" cy="0"/>
+          <a:chOff x="0" y="0"/>
+          <a:chExt cx="0" cy="0"/>
+        </a:xfrm>
+      </p:grpSpPr>
+      <p:sp>
+        <p:nvSpPr>
+          <p:cNvPr id="2" name="TextBox 1"/>
+          <p:cNvSpPr txBox="1"/>
+          <p:nvPr/>
+        </p:nvSpPr>
+        <p:spPr>
+          <a:xfrm>
+            <a:off x="2555776" y="404664"/>
+            <a:ext cx="3996159" cy="523220"/>
+          </a:xfrm>
+          <a:prstGeom prst="rect">
+            <a:avLst/>
+          </a:prstGeom>
+          <a:noFill/>
+        </p:spPr>
+        <p:txBody>
+          <a:bodyPr wrap="none" rtlCol="0">
+            <a:spAutoFit/>
+          </a:bodyPr>
+          <a:lstStyle/>
+          <a:p>
+            <a:r>
+              <a:rPr lang="en-US" sz="2800" b="1" dirty="0" smtClean="0">
+                <a:latin typeface="Calibri" charset="0"/>
+                <a:ea typeface="Calibri" charset="0"/>
+                <a:cs typeface="Calibri" charset="0"/>
+              </a:rPr>
+              <a:t>ÁRBOL DE RECURSIVIDAD</a:t>
+            </a:r>
+            <a:endParaRPr lang="en-US" sz="2800" b="1" dirty="0">
+              <a:latin typeface="Calibri" charset="0"/>
+              <a:ea typeface="Calibri" charset="0"/>
+              <a:cs typeface="Calibri" charset="0"/>
+            </a:endParaRPr>
+          </a:p>
+        </p:txBody>
+      </p:sp>
+      <p:pic>
+        <p:nvPicPr>
+          <p:cNvPr id="3" name="Picture 2"/>
+          <p:cNvPicPr>
+            <a:picLocks noChangeAspect="1"/>
+          </p:cNvPicPr>
+          <p:nvPr/>
+        </p:nvPicPr>
+        <p:blipFill>
+          <a:blip r:embed="rId3">
+            <a:extLst>
+              <a:ext uri="{28A0092B-C50C-407E-A947-70E740481C1C}">
+                <a14:useLocalDpi xmlns:a14="http://schemas.microsoft.com/office/drawing/2010/main" val="0"/>
+              </a:ext>
+            </a:extLst>
+          </a:blip>
+          <a:stretch>
+            <a:fillRect/>
+          </a:stretch>
+        </p:blipFill>
+        <p:spPr>
+          <a:xfrm>
+            <a:off x="1534477" y="1196752"/>
+            <a:ext cx="6038755" cy="2392164"/>
+          </a:xfrm>
+          <a:prstGeom prst="rect">
+            <a:avLst/>
+          </a:prstGeom>
+        </p:spPr>
+      </p:pic>
+    </p:spTree>
+    <p:extLst>
+      <p:ext uri="{BB962C8B-B14F-4D97-AF65-F5344CB8AC3E}">
+        <p14:creationId xmlns:p14="http://schemas.microsoft.com/office/powerpoint/2010/main" val="573096160"/>
+      </p:ext>
+    </p:extLst>
+  </p:cSld>
+  <p:clrMapOvr>
+    <a:masterClrMapping/>
+  </p:clrMapOvr>
+  <p:timing>
+    <p:tnLst>
+      <p:par>
+        <p:cTn id="1" dur="indefinite" restart="never" nodeType="tmRoot"/>
+      </p:par>
+    </p:tnLst>
+  </p:timing>
+</p:sld>
+</file>
+
+<file path=ppt/slides/slide14.xml><?xml version="1.0" encoding="utf-8"?>
+<p:sld xmlns:a="http://schemas.openxmlformats.org/drawingml/2006/main" xmlns:r="http://schemas.openxmlformats.org/officeDocument/2006/relationships" xmlns:p="http://schemas.openxmlformats.org/presentationml/2006/main">
+  <p:cSld>
+    <p:spTree>
+      <p:nvGrpSpPr>
+        <p:cNvPr id="1" name=""/>
+        <p:cNvGrpSpPr/>
+        <p:nvPr/>
+      </p:nvGrpSpPr>
+      <p:grpSpPr>
+        <a:xfrm>
+          <a:off x="0" y="0"/>
+          <a:ext cx="0" cy="0"/>
+          <a:chOff x="0" y="0"/>
+          <a:chExt cx="0" cy="0"/>
+        </a:xfrm>
+      </p:grpSpPr>
+      <p:sp>
+        <p:nvSpPr>
+          <p:cNvPr id="2" name="TextBox 1"/>
+          <p:cNvSpPr txBox="1"/>
+          <p:nvPr/>
+        </p:nvSpPr>
+        <p:spPr>
+          <a:xfrm>
+            <a:off x="2555776" y="404664"/>
+            <a:ext cx="3996159" cy="523220"/>
+          </a:xfrm>
+          <a:prstGeom prst="rect">
+            <a:avLst/>
+          </a:prstGeom>
+          <a:noFill/>
+        </p:spPr>
+        <p:txBody>
+          <a:bodyPr wrap="none" rtlCol="0">
+            <a:spAutoFit/>
+          </a:bodyPr>
+          <a:lstStyle/>
+          <a:p>
+            <a:r>
+              <a:rPr lang="en-US" sz="2800" b="1" dirty="0" smtClean="0">
+                <a:latin typeface="Calibri" charset="0"/>
+                <a:ea typeface="Calibri" charset="0"/>
+                <a:cs typeface="Calibri" charset="0"/>
+              </a:rPr>
+              <a:t>ÁRBOL DE RECURSIVIDAD</a:t>
+            </a:r>
+            <a:endParaRPr lang="en-US" sz="2800" b="1" dirty="0">
+              <a:latin typeface="Calibri" charset="0"/>
+              <a:ea typeface="Calibri" charset="0"/>
+              <a:cs typeface="Calibri" charset="0"/>
+            </a:endParaRPr>
+          </a:p>
+        </p:txBody>
+      </p:sp>
+      <p:pic>
+        <p:nvPicPr>
+          <p:cNvPr id="3" name="Picture 2"/>
+          <p:cNvPicPr>
+            <a:picLocks noChangeAspect="1"/>
+          </p:cNvPicPr>
+          <p:nvPr/>
+        </p:nvPicPr>
+        <p:blipFill>
+          <a:blip r:embed="rId2">
+            <a:extLst>
+              <a:ext uri="{28A0092B-C50C-407E-A947-70E740481C1C}">
+                <a14:useLocalDpi xmlns:a14="http://schemas.microsoft.com/office/drawing/2010/main" val="0"/>
+              </a:ext>
+            </a:extLst>
+          </a:blip>
+          <a:stretch>
+            <a:fillRect/>
+          </a:stretch>
+        </p:blipFill>
+        <p:spPr>
+          <a:xfrm>
+            <a:off x="1534476" y="1196752"/>
+            <a:ext cx="6038755" cy="2392164"/>
+          </a:xfrm>
+          <a:prstGeom prst="rect">
+            <a:avLst/>
+          </a:prstGeom>
+        </p:spPr>
+      </p:pic>
+      <mc:AlternateContent xmlns:mc="http://schemas.openxmlformats.org/markup-compatibility/2006">
+        <mc:Choice xmlns:a14="http://schemas.microsoft.com/office/drawing/2010/main" Requires="a14">
+          <p:sp>
+            <p:nvSpPr>
+              <p:cNvPr id="4" name="TextBox 3"/>
+              <p:cNvSpPr txBox="1"/>
+              <p:nvPr/>
+            </p:nvSpPr>
+            <p:spPr>
+              <a:xfrm>
+                <a:off x="1534477" y="3933056"/>
+                <a:ext cx="6038755" cy="1487330"/>
+              </a:xfrm>
+              <a:prstGeom prst="rect">
+                <a:avLst/>
+              </a:prstGeom>
+              <a:noFill/>
+            </p:spPr>
+            <p:txBody>
+              <a:bodyPr wrap="square" rtlCol="0">
+                <a:spAutoFit/>
+              </a:bodyPr>
+              <a:lstStyle/>
+              <a:p>
+                <a:pPr marL="285750" indent="-285750">
+                  <a:buFont typeface="Arial" charset="0"/>
+                  <a:buChar char="•"/>
+                </a:pPr>
+                <a:r>
+                  <a:rPr lang="en-US" sz="1600" dirty="0" smtClean="0"/>
+                  <a:t>En </a:t>
+                </a:r>
+                <a:r>
+                  <a:rPr lang="en-US" sz="1600" dirty="0" err="1" smtClean="0"/>
+                  <a:t>cada</a:t>
+                </a:r>
+                <a:r>
+                  <a:rPr lang="en-US" sz="1600" dirty="0" smtClean="0"/>
+                  <a:t> </a:t>
+                </a:r>
+                <a:r>
+                  <a:rPr lang="en-US" sz="1600" dirty="0" err="1" smtClean="0"/>
+                  <a:t>nivel</a:t>
+                </a:r>
+                <a:r>
+                  <a:rPr lang="en-US" sz="1600" dirty="0" smtClean="0"/>
+                  <a:t>, hay 7</a:t>
+                </a:r>
+                <a:r>
+                  <a:rPr lang="en-US" sz="1600" baseline="30000" dirty="0" smtClean="0"/>
+                  <a:t>i</a:t>
+                </a:r>
+                <a:r>
+                  <a:rPr lang="en-US" sz="1600" dirty="0" smtClean="0"/>
+                  <a:t> subproblemas.</a:t>
+                </a:r>
+              </a:p>
+              <a:p>
+                <a:pPr marL="285750" indent="-285750">
+                  <a:buFont typeface="Arial" charset="0"/>
+                  <a:buChar char="•"/>
+                </a:pPr>
+                <a:r>
+                  <a:rPr lang="en-US" sz="1600" dirty="0" smtClean="0"/>
+                  <a:t>El </a:t>
+                </a:r>
+                <a:r>
+                  <a:rPr lang="en-US" sz="1600" dirty="0" err="1" smtClean="0"/>
+                  <a:t>tamaño</a:t>
+                </a:r>
+                <a:r>
+                  <a:rPr lang="en-US" sz="1600" dirty="0" smtClean="0"/>
+                  <a:t> de </a:t>
+                </a:r>
+                <a:r>
+                  <a:rPr lang="en-US" sz="1600" dirty="0" err="1" smtClean="0"/>
+                  <a:t>cada</a:t>
+                </a:r>
+                <a:r>
+                  <a:rPr lang="en-US" sz="1600" dirty="0" smtClean="0"/>
+                  <a:t> subproblema </a:t>
+                </a:r>
+                <a:r>
+                  <a:rPr lang="en-US" sz="1600" dirty="0" err="1" smtClean="0"/>
+                  <a:t>es</a:t>
+                </a:r>
+                <a:r>
+                  <a:rPr lang="en-US" sz="1600" dirty="0" smtClean="0"/>
+                  <a:t> </a:t>
+                </a:r>
+                <a14:m>
+                  <m:oMath xmlns:m="http://schemas.openxmlformats.org/officeDocument/2006/math">
+                    <m:f>
+                      <m:fPr>
+                        <m:ctrlPr>
+                          <a:rPr lang="es-ES" sz="1600" b="0" i="1" smtClean="0">
+                            <a:latin typeface="Cambria Math" charset="0"/>
+                          </a:rPr>
+                        </m:ctrlPr>
+                      </m:fPr>
+                      <m:num>
+                        <m:r>
+                          <a:rPr lang="es-ES" sz="1600" b="0" i="1" smtClean="0">
+                            <a:latin typeface="Cambria Math" charset="0"/>
+                          </a:rPr>
+                          <m:t>𝑛</m:t>
+                        </m:r>
+                      </m:num>
+                      <m:den>
+                        <m:sSup>
+                          <m:sSupPr>
+                            <m:ctrlPr>
+                              <a:rPr lang="es-ES" sz="1600" b="0" i="1" smtClean="0">
+                                <a:latin typeface="Cambria Math" charset="0"/>
+                              </a:rPr>
+                            </m:ctrlPr>
+                          </m:sSupPr>
+                          <m:e>
+                            <m:r>
+                              <a:rPr lang="es-ES" sz="1600" b="0" i="1" smtClean="0">
+                                <a:latin typeface="Cambria Math" charset="0"/>
+                              </a:rPr>
+                              <m:t>2</m:t>
+                            </m:r>
+                          </m:e>
+                          <m:sup>
+                            <m:r>
+                              <a:rPr lang="es-ES" sz="1600" b="0" i="1" smtClean="0">
+                                <a:latin typeface="Cambria Math" charset="0"/>
+                              </a:rPr>
+                              <m:t>𝑖</m:t>
+                            </m:r>
+                          </m:sup>
+                        </m:sSup>
+                      </m:den>
+                    </m:f>
+                    <m:r>
+                      <a:rPr lang="es-ES" sz="1600" b="0" i="1" smtClean="0">
+                        <a:latin typeface="Cambria Math" charset="0"/>
+                      </a:rPr>
+                      <m:t>.</m:t>
+                    </m:r>
+                  </m:oMath>
+                </a14:m>
+                <a:endParaRPr lang="es-ES" sz="1600" b="0" dirty="0" smtClean="0"/>
+              </a:p>
+              <a:p>
+                <a:pPr marL="285750" indent="-285750">
+                  <a:buFont typeface="Arial" charset="0"/>
+                  <a:buChar char="•"/>
+                </a:pPr>
+                <a:r>
+                  <a:rPr lang="en-US" sz="1600" dirty="0" smtClean="0"/>
+                  <a:t>El </a:t>
+                </a:r>
+                <a:r>
+                  <a:rPr lang="en-US" sz="1600" dirty="0" err="1" smtClean="0"/>
+                  <a:t>tamaño</a:t>
+                </a:r>
+                <a:r>
+                  <a:rPr lang="en-US" sz="1600" dirty="0" smtClean="0"/>
+                  <a:t> de </a:t>
+                </a:r>
+                <a:r>
+                  <a:rPr lang="en-US" sz="1600" dirty="0" err="1" smtClean="0"/>
+                  <a:t>cada</a:t>
+                </a:r>
+                <a:r>
+                  <a:rPr lang="en-US" sz="1600" dirty="0" smtClean="0"/>
+                  <a:t> </a:t>
+                </a:r>
+                <a:r>
+                  <a:rPr lang="en-US" sz="1600" dirty="0" err="1" smtClean="0"/>
+                  <a:t>nivel</a:t>
+                </a:r>
+                <a:r>
+                  <a:rPr lang="en-US" sz="1600" dirty="0" smtClean="0"/>
+                  <a:t> </a:t>
+                </a:r>
+                <a:r>
+                  <a:rPr lang="en-US" sz="1600" dirty="0" err="1" smtClean="0"/>
+                  <a:t>es</a:t>
+                </a:r>
+                <a:r>
+                  <a:rPr lang="en-US" sz="1600" dirty="0" smtClean="0"/>
+                  <a:t> 7</a:t>
+                </a:r>
+                <a:r>
+                  <a:rPr lang="en-US" sz="1600" baseline="30000" dirty="0" smtClean="0"/>
+                  <a:t>i </a:t>
+                </a:r>
+                <a:r>
+                  <a:rPr lang="en-US" sz="1600" dirty="0" smtClean="0"/>
+                  <a:t>x </a:t>
+                </a:r>
+                <a14:m>
+                  <m:oMath xmlns:m="http://schemas.openxmlformats.org/officeDocument/2006/math">
+                    <m:f>
+                      <m:fPr>
+                        <m:ctrlPr>
+                          <a:rPr lang="es-ES" sz="1600" i="1">
+                            <a:latin typeface="Cambria Math" charset="0"/>
+                          </a:rPr>
+                        </m:ctrlPr>
+                      </m:fPr>
+                      <m:num>
+                        <m:r>
+                          <a:rPr lang="es-ES" sz="1600" i="1">
+                            <a:latin typeface="Cambria Math" charset="0"/>
+                          </a:rPr>
+                          <m:t>𝑛</m:t>
+                        </m:r>
+                      </m:num>
+                      <m:den>
+                        <m:sSup>
+                          <m:sSupPr>
+                            <m:ctrlPr>
+                              <a:rPr lang="es-ES" sz="1600" i="1">
+                                <a:latin typeface="Cambria Math" charset="0"/>
+                              </a:rPr>
+                            </m:ctrlPr>
+                          </m:sSupPr>
+                          <m:e>
+                            <m:r>
+                              <a:rPr lang="es-ES" sz="1600" i="1">
+                                <a:latin typeface="Cambria Math" charset="0"/>
+                              </a:rPr>
+                              <m:t>2</m:t>
+                            </m:r>
+                          </m:e>
+                          <m:sup>
+                            <m:r>
+                              <a:rPr lang="es-ES" sz="1600" i="1">
+                                <a:latin typeface="Cambria Math" charset="0"/>
+                              </a:rPr>
+                              <m:t>𝑖</m:t>
+                            </m:r>
+                          </m:sup>
+                        </m:sSup>
+                      </m:den>
+                    </m:f>
+                  </m:oMath>
+                </a14:m>
+                <a:r>
+                  <a:rPr lang="en-US" sz="1600" dirty="0" smtClean="0"/>
+                  <a:t>.</a:t>
+                </a:r>
+              </a:p>
+              <a:p>
+                <a:pPr marL="285750" indent="-285750">
+                  <a:buFont typeface="Arial" charset="0"/>
+                  <a:buChar char="•"/>
+                </a:pPr>
+                <a:r>
+                  <a:rPr lang="en-US" sz="1600" dirty="0" smtClean="0"/>
+                  <a:t>El </a:t>
+                </a:r>
+                <a:r>
+                  <a:rPr lang="en-US" sz="1600" dirty="0" err="1" smtClean="0"/>
+                  <a:t>último</a:t>
+                </a:r>
+                <a:r>
+                  <a:rPr lang="en-US" sz="1600" dirty="0" smtClean="0"/>
+                  <a:t> </a:t>
+                </a:r>
+                <a:r>
+                  <a:rPr lang="en-US" sz="1600" dirty="0" err="1" smtClean="0"/>
+                  <a:t>nivel</a:t>
+                </a:r>
+                <a:r>
+                  <a:rPr lang="en-US" sz="1600" dirty="0" smtClean="0"/>
+                  <a:t> </a:t>
+                </a:r>
+                <a:r>
+                  <a:rPr lang="en-US" sz="1600" dirty="0" err="1" smtClean="0"/>
+                  <a:t>es</a:t>
+                </a:r>
+                <a:r>
+                  <a:rPr lang="en-US" sz="1600" dirty="0" smtClean="0"/>
+                  <a:t> el </a:t>
+                </a:r>
+                <a:r>
+                  <a:rPr lang="en-US" sz="1600" dirty="0" err="1" smtClean="0"/>
+                  <a:t>nivel</a:t>
+                </a:r>
+                <a:r>
+                  <a:rPr lang="en-US" sz="1600" dirty="0" smtClean="0"/>
+                  <a:t> </a:t>
+                </a:r>
+                <a:r>
+                  <a:rPr lang="en-US" sz="1600" dirty="0" err="1" smtClean="0"/>
+                  <a:t>i</a:t>
+                </a:r>
+                <a:r>
+                  <a:rPr lang="en-US" sz="1600" dirty="0" smtClean="0"/>
+                  <a:t> = log</a:t>
+                </a:r>
+                <a:r>
+                  <a:rPr lang="en-US" sz="1600" baseline="-25000" dirty="0" smtClean="0"/>
+                  <a:t>2</a:t>
+                </a:r>
+                <a:r>
+                  <a:rPr lang="en-US" sz="1600" dirty="0" smtClean="0"/>
+                  <a:t>n.</a:t>
+                </a:r>
+              </a:p>
+              <a:p>
+                <a:pPr marL="285750" indent="-285750">
+                  <a:buFont typeface="Arial" charset="0"/>
+                  <a:buChar char="•"/>
+                </a:pPr>
+                <a:r>
+                  <a:rPr lang="en-US" sz="1600" dirty="0" err="1" smtClean="0"/>
+                  <a:t>En</a:t>
+                </a:r>
+                <a:r>
+                  <a:rPr lang="en-US" sz="1600" dirty="0" smtClean="0"/>
+                  <a:t> total hay log</a:t>
+                </a:r>
+                <a:r>
+                  <a:rPr lang="en-US" sz="1600" baseline="-25000" dirty="0"/>
+                  <a:t>2</a:t>
+                </a:r>
+                <a:r>
+                  <a:rPr lang="en-US" sz="1600" dirty="0" smtClean="0"/>
+                  <a:t>n + 1 </a:t>
+                </a:r>
+                <a:r>
+                  <a:rPr lang="en-US" sz="1600" dirty="0" err="1" smtClean="0"/>
+                  <a:t>niveles</a:t>
+                </a:r>
+                <a:r>
+                  <a:rPr lang="en-US" sz="1600" dirty="0" smtClean="0"/>
+                  <a:t>.</a:t>
+                </a:r>
+                <a:endParaRPr lang="en-US" sz="1600" dirty="0"/>
+              </a:p>
+            </p:txBody>
+          </p:sp>
+        </mc:Choice>
+        <mc:Fallback>
+          <p:sp>
+            <p:nvSpPr>
+              <p:cNvPr id="4" name="TextBox 3"/>
+              <p:cNvSpPr txBox="1">
+                <a:spLocks noRot="1" noChangeAspect="1" noMove="1" noResize="1" noEditPoints="1" noAdjustHandles="1" noChangeArrowheads="1" noChangeShapeType="1" noTextEdit="1"/>
+              </p:cNvSpPr>
+              <p:nvPr/>
+            </p:nvSpPr>
+            <p:spPr>
+              <a:xfrm>
+                <a:off x="1534477" y="3933056"/>
+                <a:ext cx="6038755" cy="1487330"/>
+              </a:xfrm>
+              <a:prstGeom prst="rect">
+                <a:avLst/>
+              </a:prstGeom>
+              <a:blipFill rotWithShape="0">
+                <a:blip r:embed="rId3"/>
+                <a:stretch>
+                  <a:fillRect l="-404" t="-1230" b="-4508"/>
+                </a:stretch>
+              </a:blipFill>
+            </p:spPr>
+            <p:txBody>
+              <a:bodyPr/>
+              <a:lstStyle/>
+              <a:p>
+                <a:r>
+                  <a:rPr lang="en-US">
+                    <a:noFill/>
+                  </a:rPr>
+                  <a:t> </a:t>
+                </a:r>
+              </a:p>
+            </p:txBody>
+          </p:sp>
+        </mc:Fallback>
+      </mc:AlternateContent>
+    </p:spTree>
+    <p:extLst>
+      <p:ext uri="{BB962C8B-B14F-4D97-AF65-F5344CB8AC3E}">
+        <p14:creationId xmlns:p14="http://schemas.microsoft.com/office/powerpoint/2010/main" val="1067654262"/>
+      </p:ext>
+    </p:extLst>
+  </p:cSld>
+  <p:clrMapOvr>
+    <a:masterClrMapping/>
+  </p:clrMapOvr>
+  <p:timing>
+    <p:tnLst>
+      <p:par>
+        <p:cTn id="1" dur="indefinite" restart="never" nodeType="tmRoot"/>
+      </p:par>
+    </p:tnLst>
+  </p:timing>
+</p:sld>
+</file>
+
+<file path=ppt/slides/slide15.xml><?xml version="1.0" encoding="utf-8"?>
+<p:sld xmlns:a="http://schemas.openxmlformats.org/drawingml/2006/main" xmlns:r="http://schemas.openxmlformats.org/officeDocument/2006/relationships" xmlns:p="http://schemas.openxmlformats.org/presentationml/2006/main">
+  <p:cSld>
+    <p:spTree>
+      <p:nvGrpSpPr>
+        <p:cNvPr id="1" name=""/>
+        <p:cNvGrpSpPr/>
+        <p:nvPr/>
+      </p:nvGrpSpPr>
+      <p:grpSpPr>
+        <a:xfrm>
+          <a:off x="0" y="0"/>
+          <a:ext cx="0" cy="0"/>
+          <a:chOff x="0" y="0"/>
+          <a:chExt cx="0" cy="0"/>
+        </a:xfrm>
+      </p:grpSpPr>
+      <p:sp>
+        <p:nvSpPr>
+          <p:cNvPr id="2" name="TextBox 1"/>
+          <p:cNvSpPr txBox="1"/>
+          <p:nvPr/>
+        </p:nvSpPr>
+        <p:spPr>
+          <a:xfrm>
+            <a:off x="2555776" y="404664"/>
+            <a:ext cx="3996159" cy="523220"/>
+          </a:xfrm>
+          <a:prstGeom prst="rect">
+            <a:avLst/>
+          </a:prstGeom>
+          <a:noFill/>
+        </p:spPr>
+        <p:txBody>
+          <a:bodyPr wrap="none" rtlCol="0">
+            <a:spAutoFit/>
+          </a:bodyPr>
+          <a:lstStyle/>
+          <a:p>
+            <a:r>
+              <a:rPr lang="en-US" sz="2800" b="1" dirty="0" smtClean="0">
+                <a:latin typeface="Calibri" charset="0"/>
+                <a:ea typeface="Calibri" charset="0"/>
+                <a:cs typeface="Calibri" charset="0"/>
+              </a:rPr>
+              <a:t>ÁRBOL DE RECURSIVIDAD</a:t>
+            </a:r>
+            <a:endParaRPr lang="en-US" sz="2800" b="1" dirty="0">
+              <a:latin typeface="Calibri" charset="0"/>
+              <a:ea typeface="Calibri" charset="0"/>
+              <a:cs typeface="Calibri" charset="0"/>
+            </a:endParaRPr>
+          </a:p>
+        </p:txBody>
+      </p:sp>
+      <p:pic>
+        <p:nvPicPr>
+          <p:cNvPr id="3" name="Picture 2"/>
+          <p:cNvPicPr>
+            <a:picLocks noChangeAspect="1"/>
+          </p:cNvPicPr>
+          <p:nvPr/>
+        </p:nvPicPr>
+        <p:blipFill>
+          <a:blip r:embed="rId2">
+            <a:extLst>
+              <a:ext uri="{28A0092B-C50C-407E-A947-70E740481C1C}">
+                <a14:useLocalDpi xmlns:a14="http://schemas.microsoft.com/office/drawing/2010/main" val="0"/>
+              </a:ext>
+            </a:extLst>
+          </a:blip>
+          <a:stretch>
+            <a:fillRect/>
+          </a:stretch>
+        </p:blipFill>
+        <p:spPr>
+          <a:xfrm>
+            <a:off x="1534476" y="1196752"/>
+            <a:ext cx="6038755" cy="2392164"/>
+          </a:xfrm>
+          <a:prstGeom prst="rect">
+            <a:avLst/>
+          </a:prstGeom>
+        </p:spPr>
+      </p:pic>
+      <p:pic>
+        <p:nvPicPr>
+          <p:cNvPr id="7" name="Picture 6"/>
+          <p:cNvPicPr>
+            <a:picLocks noChangeAspect="1"/>
+          </p:cNvPicPr>
+          <p:nvPr/>
+        </p:nvPicPr>
+        <p:blipFill>
+          <a:blip r:embed="rId3">
+            <a:extLst>
+              <a:ext uri="{28A0092B-C50C-407E-A947-70E740481C1C}">
+                <a14:useLocalDpi xmlns:a14="http://schemas.microsoft.com/office/drawing/2010/main" val="0"/>
+              </a:ext>
+            </a:extLst>
+          </a:blip>
+          <a:stretch>
+            <a:fillRect/>
+          </a:stretch>
+        </p:blipFill>
+        <p:spPr>
+          <a:xfrm>
+            <a:off x="2619076" y="3933056"/>
+            <a:ext cx="3869556" cy="1978584"/>
+          </a:xfrm>
+          <a:prstGeom prst="rect">
+            <a:avLst/>
+          </a:prstGeom>
+        </p:spPr>
+      </p:pic>
+    </p:spTree>
+    <p:extLst>
+      <p:ext uri="{BB962C8B-B14F-4D97-AF65-F5344CB8AC3E}">
+        <p14:creationId xmlns:p14="http://schemas.microsoft.com/office/powerpoint/2010/main" val="11919433"/>
+      </p:ext>
+    </p:extLst>
+  </p:cSld>
+  <p:clrMapOvr>
+    <a:masterClrMapping/>
+  </p:clrMapOvr>
+  <p:timing>
+    <p:tnLst>
+      <p:par>
+        <p:cTn id="1" dur="indefinite" restart="never" nodeType="tmRoot"/>
+      </p:par>
+    </p:tnLst>
+  </p:timing>
 </p:sld>
 </file>
 
@@ -8238,6 +9057,13 @@
   <p:clrMapOvr>
     <a:masterClrMapping/>
   </p:clrMapOvr>
+  <p:timing>
+    <p:tnLst>
+      <p:par>
+        <p:cTn id="1" dur="indefinite" restart="never" nodeType="tmRoot"/>
+      </p:par>
+    </p:tnLst>
+  </p:timing>
 </p:sld>
 </file>
 
@@ -9036,8 +9862,8 @@
           </a:p>
         </p:txBody>
       </p:sp>
-      <mc:AlternateContent xmlns:mc="http://schemas.openxmlformats.org/markup-compatibility/2006" xmlns:a14="http://schemas.microsoft.com/office/drawing/2010/main">
-        <mc:Choice Requires="a14">
+      <mc:AlternateContent xmlns:mc="http://schemas.openxmlformats.org/markup-compatibility/2006">
+        <mc:Choice xmlns:a14="http://schemas.microsoft.com/office/drawing/2010/main" Requires="a14">
           <p:sp>
             <p:nvSpPr>
               <p:cNvPr id="2" name="TextBox 1"/>
@@ -9047,7 +9873,7 @@
             <p:spPr>
               <a:xfrm>
                 <a:off x="467544" y="2920725"/>
-                <a:ext cx="8135609" cy="2267865"/>
+                <a:ext cx="8135609" cy="1800301"/>
               </a:xfrm>
               <a:prstGeom prst="rect">
                 <a:avLst/>
@@ -9068,7 +9894,7 @@
                   <a:buChar char="•"/>
                 </a:pPr>
                 <a:r>
-                  <a:rPr lang="en-US" sz="2000" dirty="0" err="1" smtClean="0">
+                  <a:rPr lang="en-US" dirty="0" err="1" smtClean="0">
                     <a:latin typeface="Calibri" charset="0"/>
                     <a:ea typeface="Calibri" charset="0"/>
                     <a:cs typeface="Calibri" charset="0"/>
@@ -9076,7 +9902,7 @@
                   <a:t>Cada</a:t>
                 </a:r>
                 <a:r>
-                  <a:rPr lang="en-US" sz="2000" dirty="0" smtClean="0">
+                  <a:rPr lang="en-US" dirty="0" smtClean="0">
                     <a:latin typeface="Calibri" charset="0"/>
                     <a:ea typeface="Calibri" charset="0"/>
                     <a:cs typeface="Calibri" charset="0"/>
@@ -9084,7 +9910,7 @@
                   <a:t> </a:t>
                 </a:r>
                 <a:r>
-                  <a:rPr lang="en-US" sz="2000" dirty="0" err="1" smtClean="0">
+                  <a:rPr lang="en-US" dirty="0" err="1" smtClean="0">
                     <a:latin typeface="Calibri" charset="0"/>
                     <a:ea typeface="Calibri" charset="0"/>
                     <a:cs typeface="Calibri" charset="0"/>
@@ -9092,7 +9918,7 @@
                   <a:t>submatriz</a:t>
                 </a:r>
                 <a:r>
-                  <a:rPr lang="en-US" sz="2000" dirty="0" smtClean="0">
+                  <a:rPr lang="en-US" dirty="0" smtClean="0">
                     <a:latin typeface="Calibri" charset="0"/>
                     <a:ea typeface="Calibri" charset="0"/>
                     <a:cs typeface="Calibri" charset="0"/>
@@ -9100,7 +9926,7 @@
                   <a:t> </a:t>
                 </a:r>
                 <a:r>
-                  <a:rPr lang="en-US" sz="2000" dirty="0" err="1" smtClean="0">
+                  <a:rPr lang="en-US" dirty="0" err="1" smtClean="0">
                     <a:latin typeface="Calibri" charset="0"/>
                     <a:ea typeface="Calibri" charset="0"/>
                     <a:cs typeface="Calibri" charset="0"/>
@@ -9108,7 +9934,7 @@
                   <a:t>tiene</a:t>
                 </a:r>
                 <a:r>
-                  <a:rPr lang="en-US" sz="2000" dirty="0" smtClean="0">
+                  <a:rPr lang="en-US" dirty="0" smtClean="0">
                     <a:latin typeface="Calibri" charset="0"/>
                     <a:ea typeface="Calibri" charset="0"/>
                     <a:cs typeface="Calibri" charset="0"/>
@@ -9116,7 +9942,7 @@
                   <a:t> un </a:t>
                 </a:r>
                 <a:r>
-                  <a:rPr lang="en-US" sz="2000" dirty="0" err="1" smtClean="0">
+                  <a:rPr lang="en-US" dirty="0" err="1" smtClean="0">
                     <a:latin typeface="Calibri" charset="0"/>
                     <a:ea typeface="Calibri" charset="0"/>
                     <a:cs typeface="Calibri" charset="0"/>
@@ -9124,7 +9950,7 @@
                   <a:t>tamaño</a:t>
                 </a:r>
                 <a:r>
-                  <a:rPr lang="en-US" sz="2000" dirty="0" smtClean="0">
+                  <a:rPr lang="en-US" dirty="0" smtClean="0">
                     <a:latin typeface="Calibri" charset="0"/>
                     <a:ea typeface="Calibri" charset="0"/>
                     <a:cs typeface="Calibri" charset="0"/>
@@ -9132,7 +9958,7 @@
                   <a:t> </a:t>
                 </a:r>
                 <a:r>
-                  <a:rPr lang="en-US" sz="2000" dirty="0" err="1" smtClean="0">
+                  <a:rPr lang="en-US" dirty="0" err="1" smtClean="0">
                     <a:latin typeface="Calibri" charset="0"/>
                     <a:ea typeface="Calibri" charset="0"/>
                     <a:cs typeface="Calibri" charset="0"/>
@@ -9140,7 +9966,7 @@
                   <a:t>igual</a:t>
                 </a:r>
                 <a:r>
-                  <a:rPr lang="en-US" sz="2000" dirty="0" smtClean="0">
+                  <a:rPr lang="en-US" dirty="0" smtClean="0">
                     <a:latin typeface="Calibri" charset="0"/>
                     <a:ea typeface="Calibri" charset="0"/>
                     <a:cs typeface="Calibri" charset="0"/>
@@ -9152,7 +9978,7 @@
                     <m:f>
                       <m:fPr>
                         <m:ctrlPr>
-                          <a:rPr lang="es-ES" sz="2000" b="0" i="1" smtClean="0">
+                          <a:rPr lang="es-ES" b="0" i="1" smtClean="0">
                             <a:latin typeface="Cambria Math" charset="0"/>
                             <a:ea typeface="Calibri" charset="0"/>
                             <a:cs typeface="Calibri" charset="0"/>
@@ -9161,7 +9987,7 @@
                       </m:fPr>
                       <m:num>
                         <m:r>
-                          <a:rPr lang="es-ES" sz="2000" b="0" i="1" smtClean="0">
+                          <a:rPr lang="es-ES" b="0" i="1" smtClean="0">
                             <a:latin typeface="Cambria Math" charset="0"/>
                             <a:ea typeface="Calibri" charset="0"/>
                             <a:cs typeface="Calibri" charset="0"/>
@@ -9171,7 +9997,7 @@
                       </m:num>
                       <m:den>
                         <m:r>
-                          <a:rPr lang="es-ES" sz="2000" b="0" i="1" smtClean="0">
+                          <a:rPr lang="es-ES" b="0" i="1" smtClean="0">
                             <a:latin typeface="Cambria Math" charset="0"/>
                             <a:ea typeface="Calibri" charset="0"/>
                             <a:cs typeface="Calibri" charset="0"/>
@@ -9181,7 +10007,7 @@
                       </m:den>
                     </m:f>
                     <m:r>
-                      <a:rPr lang="es-ES" sz="2000" b="0" i="1" smtClean="0">
+                      <a:rPr lang="es-ES" b="0" i="1" smtClean="0">
                         <a:latin typeface="Cambria Math" charset="0"/>
                         <a:ea typeface="Calibri" charset="0"/>
                         <a:cs typeface="Calibri" charset="0"/>
@@ -9191,7 +10017,7 @@
                     <m:f>
                       <m:fPr>
                         <m:ctrlPr>
-                          <a:rPr lang="es-ES" sz="2000" b="0" i="1" smtClean="0">
+                          <a:rPr lang="es-ES" b="0" i="1" smtClean="0">
                             <a:latin typeface="Cambria Math" charset="0"/>
                             <a:ea typeface="Calibri" charset="0"/>
                             <a:cs typeface="Calibri" charset="0"/>
@@ -9200,7 +10026,7 @@
                       </m:fPr>
                       <m:num>
                         <m:r>
-                          <a:rPr lang="es-ES" sz="2000" b="0" i="1" smtClean="0">
+                          <a:rPr lang="es-ES" b="0" i="1" smtClean="0">
                             <a:latin typeface="Cambria Math" charset="0"/>
                             <a:ea typeface="Calibri" charset="0"/>
                             <a:cs typeface="Calibri" charset="0"/>
@@ -9210,7 +10036,7 @@
                       </m:num>
                       <m:den>
                         <m:r>
-                          <a:rPr lang="es-ES" sz="2000" b="0" i="1" smtClean="0">
+                          <a:rPr lang="es-ES" b="0" i="1" smtClean="0">
                             <a:latin typeface="Cambria Math" charset="0"/>
                             <a:ea typeface="Calibri" charset="0"/>
                             <a:cs typeface="Calibri" charset="0"/>
@@ -9220,7 +10046,7 @@
                       </m:den>
                     </m:f>
                     <m:r>
-                      <a:rPr lang="es-ES" sz="2000" b="0" i="1" smtClean="0">
+                      <a:rPr lang="es-ES" b="0" i="1" smtClean="0">
                         <a:latin typeface="Cambria Math" charset="0"/>
                         <a:ea typeface="Calibri" charset="0"/>
                         <a:cs typeface="Calibri" charset="0"/>
@@ -9229,7 +10055,7 @@
                     </m:r>
                   </m:oMath>
                 </a14:m>
-                <a:endParaRPr lang="es-ES" sz="2000" b="0" dirty="0" smtClean="0">
+                <a:endParaRPr lang="es-ES" b="0" dirty="0" smtClean="0">
                   <a:latin typeface="Calibri" charset="0"/>
                   <a:ea typeface="Calibri" charset="0"/>
                   <a:cs typeface="Calibri" charset="0"/>
@@ -9244,7 +10070,7 @@
                   <a:buChar char="•"/>
                 </a:pPr>
                 <a:r>
-                  <a:rPr lang="en-US" sz="2000" dirty="0" smtClean="0">
+                  <a:rPr lang="en-US" dirty="0" smtClean="0">
                     <a:latin typeface="Calibri" charset="0"/>
                     <a:ea typeface="Calibri" charset="0"/>
                     <a:cs typeface="Calibri" charset="0"/>
@@ -9252,7 +10078,7 @@
                   <a:t>De </a:t>
                 </a:r>
                 <a:r>
-                  <a:rPr lang="en-US" sz="2000" dirty="0" err="1" smtClean="0">
+                  <a:rPr lang="en-US" dirty="0" err="1" smtClean="0">
                     <a:latin typeface="Calibri" charset="0"/>
                     <a:ea typeface="Calibri" charset="0"/>
                     <a:cs typeface="Calibri" charset="0"/>
@@ -9260,7 +10086,7 @@
                   <a:t>cada</a:t>
                 </a:r>
                 <a:r>
-                  <a:rPr lang="en-US" sz="2000" dirty="0" smtClean="0">
+                  <a:rPr lang="en-US" dirty="0" smtClean="0">
                     <a:latin typeface="Calibri" charset="0"/>
                     <a:ea typeface="Calibri" charset="0"/>
                     <a:cs typeface="Calibri" charset="0"/>
@@ -9268,7 +10094,7 @@
                   <a:t> </a:t>
                 </a:r>
                 <a:r>
-                  <a:rPr lang="en-US" sz="2000" dirty="0" err="1" smtClean="0">
+                  <a:rPr lang="en-US" dirty="0" err="1" smtClean="0">
                     <a:latin typeface="Calibri" charset="0"/>
                     <a:ea typeface="Calibri" charset="0"/>
                     <a:cs typeface="Calibri" charset="0"/>
@@ -9276,7 +10102,7 @@
                   <a:t>problema</a:t>
                 </a:r>
                 <a:r>
-                  <a:rPr lang="en-US" sz="2000" dirty="0" smtClean="0">
+                  <a:rPr lang="en-US" dirty="0" smtClean="0">
                     <a:latin typeface="Calibri" charset="0"/>
                     <a:ea typeface="Calibri" charset="0"/>
                     <a:cs typeface="Calibri" charset="0"/>
@@ -9284,7 +10110,7 @@
                   <a:t> </a:t>
                 </a:r>
                 <a:r>
-                  <a:rPr lang="en-US" sz="2000" dirty="0" err="1" smtClean="0">
+                  <a:rPr lang="en-US" dirty="0" err="1" smtClean="0">
                     <a:latin typeface="Calibri" charset="0"/>
                     <a:ea typeface="Calibri" charset="0"/>
                     <a:cs typeface="Calibri" charset="0"/>
@@ -9292,7 +10118,7 @@
                   <a:t>surgen</a:t>
                 </a:r>
                 <a:r>
-                  <a:rPr lang="en-US" sz="2000" dirty="0" smtClean="0">
+                  <a:rPr lang="en-US" dirty="0" smtClean="0">
                     <a:latin typeface="Calibri" charset="0"/>
                     <a:ea typeface="Calibri" charset="0"/>
                     <a:cs typeface="Calibri" charset="0"/>
@@ -9300,7 +10126,7 @@
                   <a:t> 8 </a:t>
                 </a:r>
                 <a:r>
-                  <a:rPr lang="en-US" sz="2000" dirty="0" err="1" smtClean="0">
+                  <a:rPr lang="en-US" dirty="0" err="1" smtClean="0">
                     <a:latin typeface="Calibri" charset="0"/>
                     <a:ea typeface="Calibri" charset="0"/>
                     <a:cs typeface="Calibri" charset="0"/>
@@ -9308,7 +10134,7 @@
                   <a:t>nuevos</a:t>
                 </a:r>
                 <a:r>
-                  <a:rPr lang="en-US" sz="2000" dirty="0" smtClean="0">
+                  <a:rPr lang="en-US" dirty="0" smtClean="0">
                     <a:latin typeface="Calibri" charset="0"/>
                     <a:ea typeface="Calibri" charset="0"/>
                     <a:cs typeface="Calibri" charset="0"/>
@@ -9325,7 +10151,7 @@
                   <a:buChar char="•"/>
                 </a:pPr>
                 <a:r>
-                  <a:rPr lang="en-US" sz="2000" dirty="0" smtClean="0">
+                  <a:rPr lang="en-US" dirty="0" smtClean="0">
                     <a:latin typeface="Calibri" charset="0"/>
                     <a:ea typeface="Calibri" charset="0"/>
                     <a:cs typeface="Calibri" charset="0"/>
@@ -9333,7 +10159,7 @@
                   <a:t>El </a:t>
                 </a:r>
                 <a:r>
-                  <a:rPr lang="en-US" sz="2000" dirty="0" err="1" smtClean="0">
+                  <a:rPr lang="en-US" dirty="0" err="1" smtClean="0">
                     <a:latin typeface="Calibri" charset="0"/>
                     <a:ea typeface="Calibri" charset="0"/>
                     <a:cs typeface="Calibri" charset="0"/>
@@ -9341,7 +10167,7 @@
                   <a:t>tiempo</a:t>
                 </a:r>
                 <a:r>
-                  <a:rPr lang="en-US" sz="2000" dirty="0" smtClean="0">
+                  <a:rPr lang="en-US" dirty="0" smtClean="0">
                     <a:latin typeface="Calibri" charset="0"/>
                     <a:ea typeface="Calibri" charset="0"/>
                     <a:cs typeface="Calibri" charset="0"/>
@@ -9349,7 +10175,7 @@
                   <a:t> </a:t>
                 </a:r>
                 <a:r>
-                  <a:rPr lang="en-US" sz="2000" dirty="0" err="1" smtClean="0">
+                  <a:rPr lang="en-US" dirty="0" err="1" smtClean="0">
                     <a:latin typeface="Calibri" charset="0"/>
                     <a:ea typeface="Calibri" charset="0"/>
                     <a:cs typeface="Calibri" charset="0"/>
@@ -9357,7 +10183,7 @@
                   <a:t>invertido</a:t>
                 </a:r>
                 <a:r>
-                  <a:rPr lang="en-US" sz="2000" dirty="0" smtClean="0">
+                  <a:rPr lang="en-US" dirty="0" smtClean="0">
                     <a:latin typeface="Calibri" charset="0"/>
                     <a:ea typeface="Calibri" charset="0"/>
                     <a:cs typeface="Calibri" charset="0"/>
@@ -9365,7 +10191,7 @@
                   <a:t> para </a:t>
                 </a:r>
                 <a:r>
-                  <a:rPr lang="en-US" sz="2000" dirty="0" err="1" smtClean="0">
+                  <a:rPr lang="en-US" dirty="0" err="1" smtClean="0">
                     <a:latin typeface="Calibri" charset="0"/>
                     <a:ea typeface="Calibri" charset="0"/>
                     <a:cs typeface="Calibri" charset="0"/>
@@ -9373,7 +10199,7 @@
                   <a:t>dividir</a:t>
                 </a:r>
                 <a:r>
-                  <a:rPr lang="en-US" sz="2000" dirty="0" smtClean="0">
+                  <a:rPr lang="en-US" dirty="0" smtClean="0">
                     <a:latin typeface="Calibri" charset="0"/>
                     <a:ea typeface="Calibri" charset="0"/>
                     <a:cs typeface="Calibri" charset="0"/>
@@ -9381,7 +10207,7 @@
                   <a:t> </a:t>
                 </a:r>
                 <a:r>
-                  <a:rPr lang="en-US" sz="2000" dirty="0" err="1" smtClean="0">
+                  <a:rPr lang="en-US" dirty="0" err="1" smtClean="0">
                     <a:latin typeface="Calibri" charset="0"/>
                     <a:ea typeface="Calibri" charset="0"/>
                     <a:cs typeface="Calibri" charset="0"/>
@@ -9389,7 +10215,7 @@
                   <a:t>en</a:t>
                 </a:r>
                 <a:r>
-                  <a:rPr lang="en-US" sz="2000" dirty="0" smtClean="0">
+                  <a:rPr lang="en-US" dirty="0" smtClean="0">
                     <a:latin typeface="Calibri" charset="0"/>
                     <a:ea typeface="Calibri" charset="0"/>
                     <a:cs typeface="Calibri" charset="0"/>
@@ -9397,7 +10223,7 @@
                   <a:t> submatrices se </a:t>
                 </a:r>
                 <a:r>
-                  <a:rPr lang="en-US" sz="2000" dirty="0" err="1" smtClean="0">
+                  <a:rPr lang="en-US" dirty="0" err="1" smtClean="0">
                     <a:latin typeface="Calibri" charset="0"/>
                     <a:ea typeface="Calibri" charset="0"/>
                     <a:cs typeface="Calibri" charset="0"/>
@@ -9405,7 +10231,7 @@
                   <a:t>considera</a:t>
                 </a:r>
                 <a:r>
-                  <a:rPr lang="en-US" sz="2000" dirty="0" smtClean="0">
+                  <a:rPr lang="en-US" dirty="0" smtClean="0">
                     <a:latin typeface="Calibri" charset="0"/>
                     <a:ea typeface="Calibri" charset="0"/>
                     <a:cs typeface="Calibri" charset="0"/>
@@ -9413,7 +10239,7 @@
                   <a:t> </a:t>
                 </a:r>
                 <a:r>
-                  <a:rPr lang="en-US" sz="2000" dirty="0" err="1" smtClean="0">
+                  <a:rPr lang="en-US" dirty="0" err="1" smtClean="0">
                     <a:latin typeface="Calibri" charset="0"/>
                     <a:ea typeface="Calibri" charset="0"/>
                     <a:cs typeface="Calibri" charset="0"/>
@@ -9421,7 +10247,7 @@
                   <a:t>constante</a:t>
                 </a:r>
                 <a:r>
-                  <a:rPr lang="en-US" sz="2000" dirty="0" smtClean="0">
+                  <a:rPr lang="en-US" dirty="0" smtClean="0">
                     <a:latin typeface="Calibri" charset="0"/>
                     <a:ea typeface="Calibri" charset="0"/>
                     <a:cs typeface="Calibri" charset="0"/>
@@ -9438,7 +10264,7 @@
                   <a:buChar char="•"/>
                 </a:pPr>
                 <a:r>
-                  <a:rPr lang="en-US" sz="2000" dirty="0" smtClean="0">
+                  <a:rPr lang="en-US" dirty="0" smtClean="0">
                     <a:latin typeface="Calibri" charset="0"/>
                     <a:ea typeface="Calibri" charset="0"/>
                     <a:cs typeface="Calibri" charset="0"/>
@@ -9446,7 +10272,7 @@
                   <a:t>El </a:t>
                 </a:r>
                 <a:r>
-                  <a:rPr lang="en-US" sz="2000" dirty="0" err="1" smtClean="0">
+                  <a:rPr lang="en-US" dirty="0" err="1" smtClean="0">
                     <a:latin typeface="Calibri" charset="0"/>
                     <a:ea typeface="Calibri" charset="0"/>
                     <a:cs typeface="Calibri" charset="0"/>
@@ -9454,7 +10280,7 @@
                   <a:t>tiempo</a:t>
                 </a:r>
                 <a:r>
-                  <a:rPr lang="en-US" sz="2000" dirty="0" smtClean="0">
+                  <a:rPr lang="en-US" dirty="0" smtClean="0">
                     <a:latin typeface="Calibri" charset="0"/>
                     <a:ea typeface="Calibri" charset="0"/>
                     <a:cs typeface="Calibri" charset="0"/>
@@ -9462,7 +10288,7 @@
                   <a:t> </a:t>
                 </a:r>
                 <a:r>
-                  <a:rPr lang="en-US" sz="2000" dirty="0" err="1" smtClean="0">
+                  <a:rPr lang="en-US" dirty="0" err="1" smtClean="0">
                     <a:latin typeface="Calibri" charset="0"/>
                     <a:ea typeface="Calibri" charset="0"/>
                     <a:cs typeface="Calibri" charset="0"/>
@@ -9470,7 +10296,7 @@
                   <a:t>invertido</a:t>
                 </a:r>
                 <a:r>
-                  <a:rPr lang="en-US" sz="2000" dirty="0" smtClean="0">
+                  <a:rPr lang="en-US" dirty="0" smtClean="0">
                     <a:latin typeface="Calibri" charset="0"/>
                     <a:ea typeface="Calibri" charset="0"/>
                     <a:cs typeface="Calibri" charset="0"/>
@@ -9478,7 +10304,7 @@
                   <a:t> </a:t>
                 </a:r>
                 <a:r>
-                  <a:rPr lang="en-US" sz="2000" dirty="0" err="1" smtClean="0">
+                  <a:rPr lang="en-US" dirty="0" err="1" smtClean="0">
                     <a:latin typeface="Calibri" charset="0"/>
                     <a:ea typeface="Calibri" charset="0"/>
                     <a:cs typeface="Calibri" charset="0"/>
@@ -9486,7 +10312,7 @@
                   <a:t>en</a:t>
                 </a:r>
                 <a:r>
-                  <a:rPr lang="en-US" sz="2000" dirty="0" smtClean="0">
+                  <a:rPr lang="en-US" dirty="0" smtClean="0">
                     <a:latin typeface="Calibri" charset="0"/>
                     <a:ea typeface="Calibri" charset="0"/>
                     <a:cs typeface="Calibri" charset="0"/>
@@ -9494,7 +10320,7 @@
                   <a:t> </a:t>
                 </a:r>
                 <a:r>
-                  <a:rPr lang="en-US" sz="2000" dirty="0" err="1" smtClean="0">
+                  <a:rPr lang="en-US" dirty="0" err="1" smtClean="0">
                     <a:latin typeface="Calibri" charset="0"/>
                     <a:ea typeface="Calibri" charset="0"/>
                     <a:cs typeface="Calibri" charset="0"/>
@@ -9502,7 +10328,7 @@
                   <a:t>combinar</a:t>
                 </a:r>
                 <a:r>
-                  <a:rPr lang="en-US" sz="2000" dirty="0" smtClean="0">
+                  <a:rPr lang="en-US" dirty="0" smtClean="0">
                     <a:latin typeface="Calibri" charset="0"/>
                     <a:ea typeface="Calibri" charset="0"/>
                     <a:cs typeface="Calibri" charset="0"/>
@@ -9510,7 +10336,7 @@
                   <a:t> </a:t>
                 </a:r>
                 <a:r>
-                  <a:rPr lang="en-US" sz="2000" dirty="0" err="1" smtClean="0">
+                  <a:rPr lang="en-US" dirty="0" err="1" smtClean="0">
                     <a:latin typeface="Calibri" charset="0"/>
                     <a:ea typeface="Calibri" charset="0"/>
                     <a:cs typeface="Calibri" charset="0"/>
@@ -9518,7 +10344,7 @@
                   <a:t>es</a:t>
                 </a:r>
                 <a:r>
-                  <a:rPr lang="en-US" sz="2000" dirty="0" smtClean="0">
+                  <a:rPr lang="en-US" dirty="0" smtClean="0">
                     <a:latin typeface="Calibri" charset="0"/>
                     <a:ea typeface="Calibri" charset="0"/>
                     <a:cs typeface="Calibri" charset="0"/>
@@ -9526,7 +10352,7 @@
                   <a:t> </a:t>
                 </a:r>
                 <a:r>
-                  <a:rPr lang="en-US" sz="2000" dirty="0" err="1" smtClean="0">
+                  <a:rPr lang="en-US" dirty="0" err="1" smtClean="0">
                     <a:latin typeface="Calibri" charset="0"/>
                     <a:ea typeface="Calibri" charset="0"/>
                     <a:cs typeface="Calibri" charset="0"/>
@@ -9534,7 +10360,7 @@
                   <a:t>proporcional</a:t>
                 </a:r>
                 <a:r>
-                  <a:rPr lang="en-US" sz="2000" dirty="0" smtClean="0">
+                  <a:rPr lang="en-US" dirty="0" smtClean="0">
                     <a:latin typeface="Calibri" charset="0"/>
                     <a:ea typeface="Calibri" charset="0"/>
                     <a:cs typeface="Calibri" charset="0"/>
@@ -9542,7 +10368,7 @@
                   <a:t> al </a:t>
                 </a:r>
                 <a:r>
-                  <a:rPr lang="en-US" sz="2000" dirty="0" err="1" smtClean="0">
+                  <a:rPr lang="en-US" dirty="0" err="1" smtClean="0">
                     <a:latin typeface="Calibri" charset="0"/>
                     <a:ea typeface="Calibri" charset="0"/>
                     <a:cs typeface="Calibri" charset="0"/>
@@ -9550,7 +10376,7 @@
                   <a:t>número</a:t>
                 </a:r>
                 <a:r>
-                  <a:rPr lang="en-US" sz="2000" dirty="0" smtClean="0">
+                  <a:rPr lang="en-US" dirty="0" smtClean="0">
                     <a:latin typeface="Calibri" charset="0"/>
                     <a:ea typeface="Calibri" charset="0"/>
                     <a:cs typeface="Calibri" charset="0"/>
@@ -9558,7 +10384,7 @@
                   <a:t> de entradas de la </a:t>
                 </a:r>
                 <a:r>
-                  <a:rPr lang="en-US" sz="2000" dirty="0" err="1" smtClean="0">
+                  <a:rPr lang="en-US" dirty="0" err="1" smtClean="0">
                     <a:latin typeface="Calibri" charset="0"/>
                     <a:ea typeface="Calibri" charset="0"/>
                     <a:cs typeface="Calibri" charset="0"/>
@@ -9566,7 +10392,7 @@
                   <a:t>matriz</a:t>
                 </a:r>
                 <a:r>
-                  <a:rPr lang="en-US" sz="2000" dirty="0" smtClean="0">
+                  <a:rPr lang="en-US" dirty="0" smtClean="0">
                     <a:latin typeface="Calibri" charset="0"/>
                     <a:ea typeface="Calibri" charset="0"/>
                     <a:cs typeface="Calibri" charset="0"/>
@@ -9574,7 +10400,7 @@
                   <a:t> “</a:t>
                 </a:r>
                 <a:r>
-                  <a:rPr lang="en-US" sz="2000" dirty="0" err="1" smtClean="0">
+                  <a:rPr lang="en-US" dirty="0" err="1" smtClean="0">
                     <a:latin typeface="Calibri" charset="0"/>
                     <a:ea typeface="Calibri" charset="0"/>
                     <a:cs typeface="Calibri" charset="0"/>
@@ -9582,7 +10408,7 @@
                   <a:t>grande</a:t>
                 </a:r>
                 <a:r>
-                  <a:rPr lang="en-US" sz="2000" dirty="0" smtClean="0">
+                  <a:rPr lang="en-US" dirty="0" smtClean="0">
                     <a:latin typeface="Calibri" charset="0"/>
                     <a:ea typeface="Calibri" charset="0"/>
                     <a:cs typeface="Calibri" charset="0"/>
@@ -9590,7 +10416,7 @@
                   <a:t>”: </a:t>
                 </a:r>
                 <a:r>
-                  <a:rPr lang="en-US" sz="2000" dirty="0">
+                  <a:rPr lang="en-US" dirty="0">
                     <a:latin typeface="Calibri" charset="0"/>
                     <a:ea typeface="Calibri" charset="0"/>
                     <a:cs typeface="Calibri" charset="0"/>
@@ -9598,7 +10424,7 @@
                   <a:t>⍬</a:t>
                 </a:r>
                 <a:r>
-                  <a:rPr lang="en-US" sz="2000" dirty="0" smtClean="0">
+                  <a:rPr lang="en-US" dirty="0" smtClean="0">
                     <a:latin typeface="Calibri" charset="0"/>
                     <a:ea typeface="Calibri" charset="0"/>
                     <a:cs typeface="Calibri" charset="0"/>
@@ -9606,7 +10432,7 @@
                   <a:t>(n</a:t>
                 </a:r>
                 <a:r>
-                  <a:rPr lang="en-US" sz="2000" baseline="30000" dirty="0" smtClean="0">
+                  <a:rPr lang="en-US" baseline="30000" dirty="0" smtClean="0">
                     <a:latin typeface="Calibri" charset="0"/>
                     <a:ea typeface="Calibri" charset="0"/>
                     <a:cs typeface="Calibri" charset="0"/>
@@ -9614,14 +10440,14 @@
                   <a:t>2</a:t>
                 </a:r>
                 <a:r>
-                  <a:rPr lang="en-US" sz="2000" dirty="0" smtClean="0">
+                  <a:rPr lang="en-US" dirty="0" smtClean="0">
                     <a:latin typeface="Calibri" charset="0"/>
                     <a:ea typeface="Calibri" charset="0"/>
                     <a:cs typeface="Calibri" charset="0"/>
                   </a:rPr>
                   <a:t>).</a:t>
                 </a:r>
-                <a:endParaRPr lang="en-US" sz="2000" dirty="0">
+                <a:endParaRPr lang="en-US" dirty="0">
                   <a:latin typeface="Calibri" charset="0"/>
                   <a:ea typeface="Calibri" charset="0"/>
                   <a:cs typeface="Calibri" charset="0"/>
@@ -9630,7 +10456,7 @@
             </p:txBody>
           </p:sp>
         </mc:Choice>
-        <mc:Fallback xmlns="">
+        <mc:Fallback>
           <p:sp>
             <p:nvSpPr>
               <p:cNvPr id="2" name="TextBox 1"/>
@@ -9642,7 +10468,7 @@
             <p:spPr>
               <a:xfrm>
                 <a:off x="467544" y="2920725"/>
-                <a:ext cx="8135609" cy="2267865"/>
+                <a:ext cx="8135609" cy="1800301"/>
               </a:xfrm>
               <a:prstGeom prst="rect">
                 <a:avLst/>
@@ -9650,7 +10476,7 @@
               <a:blipFill rotWithShape="0">
                 <a:blip r:embed="rId2"/>
                 <a:stretch>
-                  <a:fillRect l="-675" b="-4032"/>
+                  <a:fillRect l="-525" b="-4746"/>
                 </a:stretch>
               </a:blipFill>
             </p:spPr>
@@ -9970,6 +10796,13 @@
   <p:clrMapOvr>
     <a:masterClrMapping/>
   </p:clrMapOvr>
+  <p:timing>
+    <p:tnLst>
+      <p:par>
+        <p:cTn id="1" dur="indefinite" restart="never" nodeType="tmRoot"/>
+      </p:par>
+    </p:tnLst>
+  </p:timing>
 </p:sld>
 </file>
 
@@ -10324,6 +11157,13 @@
   <p:clrMapOvr>
     <a:masterClrMapping/>
   </p:clrMapOvr>
+  <p:timing>
+    <p:tnLst>
+      <p:par>
+        <p:cTn id="1" dur="indefinite" restart="never" nodeType="tmRoot"/>
+      </p:par>
+    </p:tnLst>
+  </p:timing>
 </p:sld>
 </file>
 
@@ -12038,6 +12878,13 @@
   <p:clrMapOvr>
     <a:masterClrMapping/>
   </p:clrMapOvr>
+  <p:timing>
+    <p:tnLst>
+      <p:par>
+        <p:cTn id="1" dur="indefinite" restart="never" nodeType="tmRoot"/>
+      </p:par>
+    </p:tnLst>
+  </p:timing>
 </p:sld>
 </file>
 

</xml_diff>